<commit_message>
path seperaters changed again
</commit_message>
<xml_diff>
--- a/CORONA_Model2.pptx
+++ b/CORONA_Model2.pptx
@@ -19883,9 +19883,9 @@
         <p:grpSpPr>
           <a:xfrm>
             <a:off x="2097824" y="1841016"/>
-            <a:ext cx="1502072" cy="819687"/>
+            <a:ext cx="1673594" cy="819687"/>
             <a:chOff x="5737167" y="2529821"/>
-            <a:chExt cx="1502072" cy="819687"/>
+            <a:chExt cx="1673594" cy="819687"/>
           </a:xfrm>
         </p:grpSpPr>
         <p:sp>
@@ -19897,7 +19897,7 @@
           <p:spPr>
             <a:xfrm>
               <a:off x="5956837" y="2980176"/>
-              <a:ext cx="1282402" cy="369332"/>
+              <a:ext cx="1453924" cy="369332"/>
             </a:xfrm>
             <a:prstGeom prst="rect">
               <a:avLst/>
@@ -19913,6 +19913,10 @@
               <a:r>
                 <a:rPr lang="de-DE" dirty="0" err="1" smtClean="0"/>
                 <a:t>progression</a:t>
+              </a:r>
+              <a:r>
+                <a:rPr lang="de-DE" dirty="0" smtClean="0"/>
+                <a:t> p</a:t>
               </a:r>
               <a:endParaRPr lang="en-US" dirty="0"/>
             </a:p>
@@ -20286,9 +20290,9 @@
           <p:nvPr/>
         </p:nvSpPr>
         <p:spPr>
-          <a:xfrm rot="16200000">
-            <a:off x="1767517" y="1845145"/>
-            <a:ext cx="712952" cy="369332"/>
+          <a:xfrm>
+            <a:off x="2137729" y="1691379"/>
+            <a:ext cx="383438" cy="369332"/>
           </a:xfrm>
           <a:prstGeom prst="rect">
             <a:avLst/>
@@ -20302,10 +20306,14 @@
           <a:lstStyle/>
           <a:p>
             <a:r>
-              <a:rPr lang="de-DE" dirty="0" err="1" smtClean="0"/>
-              <a:t>infect</a:t>
-            </a:r>
-            <a:endParaRPr lang="en-US" dirty="0"/>
+              <a:rPr lang="de-DE" dirty="0" smtClean="0"/>
+              <a:t>P</a:t>
+            </a:r>
+            <a:r>
+              <a:rPr lang="de-DE" baseline="-25000" dirty="0" smtClean="0"/>
+              <a:t>p</a:t>
+            </a:r>
+            <a:endParaRPr lang="en-US" baseline="-25000" dirty="0"/>
           </a:p>
         </p:txBody>
       </p:sp>
@@ -20394,6 +20402,36 @@
             <a:r>
               <a:rPr lang="de-DE" dirty="0" err="1" smtClean="0"/>
               <a:t>hospitalized</a:t>
+            </a:r>
+            <a:endParaRPr lang="en-US" dirty="0"/>
+          </a:p>
+        </p:txBody>
+      </p:sp>
+      <p:sp>
+        <p:nvSpPr>
+          <p:cNvPr id="71" name="Textfeld 70"/>
+          <p:cNvSpPr txBox="1"/>
+          <p:nvPr/>
+        </p:nvSpPr>
+        <p:spPr>
+          <a:xfrm>
+            <a:off x="3711121" y="2186408"/>
+            <a:ext cx="242374" cy="369332"/>
+          </a:xfrm>
+          <a:prstGeom prst="rect">
+            <a:avLst/>
+          </a:prstGeom>
+          <a:noFill/>
+        </p:spPr>
+        <p:txBody>
+          <a:bodyPr wrap="none" rtlCol="0">
+            <a:spAutoFit/>
+          </a:bodyPr>
+          <a:lstStyle/>
+          <a:p>
+            <a:r>
+              <a:rPr lang="de-DE" dirty="0" smtClean="0"/>
+              <a:t>I</a:t>
             </a:r>
             <a:endParaRPr lang="en-US" dirty="0"/>
           </a:p>

</xml_diff>

<commit_message>
Updates. Added load/save function for Corona model. Extended model by an Age-to-age transmission matrix Variables can now have different axes than the standard axes.
</commit_message>
<xml_diff>
--- a/CORONA_Model2.pptx
+++ b/CORONA_Model2.pptx
@@ -247,7 +247,7 @@
           <a:p>
             <a:fld id="{892A93C0-FA96-4AF9-A2A1-287FA3C3E6F8}" type="datetimeFigureOut">
               <a:rPr lang="en-US" smtClean="0"/>
-              <a:t>5/13/2020</a:t>
+              <a:t>11/5/2020</a:t>
             </a:fld>
             <a:endParaRPr lang="en-US"/>
           </a:p>
@@ -417,7 +417,7 @@
           <a:p>
             <a:fld id="{892A93C0-FA96-4AF9-A2A1-287FA3C3E6F8}" type="datetimeFigureOut">
               <a:rPr lang="en-US" smtClean="0"/>
-              <a:t>5/13/2020</a:t>
+              <a:t>11/5/2020</a:t>
             </a:fld>
             <a:endParaRPr lang="en-US"/>
           </a:p>
@@ -597,7 +597,7 @@
           <a:p>
             <a:fld id="{892A93C0-FA96-4AF9-A2A1-287FA3C3E6F8}" type="datetimeFigureOut">
               <a:rPr lang="en-US" smtClean="0"/>
-              <a:t>5/13/2020</a:t>
+              <a:t>11/5/2020</a:t>
             </a:fld>
             <a:endParaRPr lang="en-US"/>
           </a:p>
@@ -767,7 +767,7 @@
           <a:p>
             <a:fld id="{892A93C0-FA96-4AF9-A2A1-287FA3C3E6F8}" type="datetimeFigureOut">
               <a:rPr lang="en-US" smtClean="0"/>
-              <a:t>5/13/2020</a:t>
+              <a:t>11/5/2020</a:t>
             </a:fld>
             <a:endParaRPr lang="en-US"/>
           </a:p>
@@ -1013,7 +1013,7 @@
           <a:p>
             <a:fld id="{892A93C0-FA96-4AF9-A2A1-287FA3C3E6F8}" type="datetimeFigureOut">
               <a:rPr lang="en-US" smtClean="0"/>
-              <a:t>5/13/2020</a:t>
+              <a:t>11/5/2020</a:t>
             </a:fld>
             <a:endParaRPr lang="en-US"/>
           </a:p>
@@ -1245,7 +1245,7 @@
           <a:p>
             <a:fld id="{892A93C0-FA96-4AF9-A2A1-287FA3C3E6F8}" type="datetimeFigureOut">
               <a:rPr lang="en-US" smtClean="0"/>
-              <a:t>5/13/2020</a:t>
+              <a:t>11/5/2020</a:t>
             </a:fld>
             <a:endParaRPr lang="en-US"/>
           </a:p>
@@ -1612,7 +1612,7 @@
           <a:p>
             <a:fld id="{892A93C0-FA96-4AF9-A2A1-287FA3C3E6F8}" type="datetimeFigureOut">
               <a:rPr lang="en-US" smtClean="0"/>
-              <a:t>5/13/2020</a:t>
+              <a:t>11/5/2020</a:t>
             </a:fld>
             <a:endParaRPr lang="en-US"/>
           </a:p>
@@ -1730,7 +1730,7 @@
           <a:p>
             <a:fld id="{892A93C0-FA96-4AF9-A2A1-287FA3C3E6F8}" type="datetimeFigureOut">
               <a:rPr lang="en-US" smtClean="0"/>
-              <a:t>5/13/2020</a:t>
+              <a:t>11/5/2020</a:t>
             </a:fld>
             <a:endParaRPr lang="en-US"/>
           </a:p>
@@ -1825,7 +1825,7 @@
           <a:p>
             <a:fld id="{892A93C0-FA96-4AF9-A2A1-287FA3C3E6F8}" type="datetimeFigureOut">
               <a:rPr lang="en-US" smtClean="0"/>
-              <a:t>5/13/2020</a:t>
+              <a:t>11/5/2020</a:t>
             </a:fld>
             <a:endParaRPr lang="en-US"/>
           </a:p>
@@ -2102,7 +2102,7 @@
           <a:p>
             <a:fld id="{892A93C0-FA96-4AF9-A2A1-287FA3C3E6F8}" type="datetimeFigureOut">
               <a:rPr lang="en-US" smtClean="0"/>
-              <a:t>5/13/2020</a:t>
+              <a:t>11/5/2020</a:t>
             </a:fld>
             <a:endParaRPr lang="en-US"/>
           </a:p>
@@ -2355,7 +2355,7 @@
           <a:p>
             <a:fld id="{892A93C0-FA96-4AF9-A2A1-287FA3C3E6F8}" type="datetimeFigureOut">
               <a:rPr lang="en-US" smtClean="0"/>
-              <a:t>5/13/2020</a:t>
+              <a:t>11/5/2020</a:t>
             </a:fld>
             <a:endParaRPr lang="en-US"/>
           </a:p>
@@ -2568,7 +2568,7 @@
           <a:p>
             <a:fld id="{892A93C0-FA96-4AF9-A2A1-287FA3C3E6F8}" type="datetimeFigureOut">
               <a:rPr lang="en-US" smtClean="0"/>
-              <a:t>5/13/2020</a:t>
+              <a:t>11/5/2020</a:t>
             </a:fld>
             <a:endParaRPr lang="en-US"/>
           </a:p>
@@ -13423,7 +13423,7 @@
           <p:spPr>
             <a:xfrm>
               <a:off x="1020228" y="1610336"/>
-              <a:ext cx="852156" cy="474410"/>
+              <a:ext cx="540212" cy="474410"/>
             </a:xfrm>
             <a:prstGeom prst="rect">
               <a:avLst/>
@@ -13437,8 +13437,8 @@
             <a:lstStyle/>
             <a:p>
               <a:r>
-                <a:rPr lang="de-DE" dirty="0" err="1" smtClean="0"/>
-                <a:t>District</a:t>
+                <a:rPr lang="de-DE" dirty="0" smtClean="0"/>
+                <a:t>Age</a:t>
               </a:r>
               <a:endParaRPr lang="en-US" dirty="0"/>
             </a:p>
@@ -14664,8 +14664,8 @@
           </a:fontRef>
         </p:style>
       </p:cxnSp>
-      <mc:AlternateContent xmlns:mc="http://schemas.openxmlformats.org/markup-compatibility/2006">
-        <mc:Choice xmlns:a14="http://schemas.microsoft.com/office/drawing/2010/main" Requires="a14">
+      <mc:AlternateContent xmlns:mc="http://schemas.openxmlformats.org/markup-compatibility/2006" xmlns:a14="http://schemas.microsoft.com/office/drawing/2010/main">
+        <mc:Choice Requires="a14">
           <p:sp>
             <p:nvSpPr>
               <p:cNvPr id="144" name="Textfeld 143"/>
@@ -14711,62 +14711,84 @@
                         <m:sSub>
                           <m:sSubPr>
                             <m:ctrlPr>
-                              <a:rPr lang="en-US" i="1"/>
+                              <a:rPr lang="en-US" i="1">
+                                <a:latin typeface="Cambria Math" panose="02040503050406030204" pitchFamily="18" charset="0"/>
+                              </a:rPr>
                             </m:ctrlPr>
                           </m:sSubPr>
                           <m:e>
                             <m:r>
-                              <a:rPr lang="en-US" i="1"/>
+                              <a:rPr lang="en-US" i="1">
+                                <a:latin typeface="Cambria Math" panose="02040503050406030204" pitchFamily="18" charset="0"/>
+                              </a:rPr>
                               <m:t>𝐼</m:t>
                             </m:r>
                           </m:e>
                           <m:sub>
                             <m:r>
-                              <a:rPr lang="en-US" i="1"/>
+                              <a:rPr lang="en-US" i="1">
+                                <a:latin typeface="Cambria Math" panose="02040503050406030204" pitchFamily="18" charset="0"/>
+                              </a:rPr>
                               <m:t>𝑝</m:t>
                             </m:r>
                           </m:sub>
                         </m:sSub>
                         <m:r>
-                          <a:rPr lang="en-US" i="1"/>
+                          <a:rPr lang="en-US" i="1">
+                            <a:latin typeface="Cambria Math" panose="02040503050406030204" pitchFamily="18" charset="0"/>
+                          </a:rPr>
                           <m:t> </m:t>
                         </m:r>
                         <m:r>
-                          <a:rPr lang="en-US" i="1"/>
+                          <a:rPr lang="en-US" i="1">
+                            <a:latin typeface="Cambria Math" panose="02040503050406030204" pitchFamily="18" charset="0"/>
+                          </a:rPr>
                           <m:t>𝑅</m:t>
                         </m:r>
                         <m:d>
                           <m:dPr>
                             <m:ctrlPr>
-                              <a:rPr lang="en-US" i="1"/>
+                              <a:rPr lang="en-US" i="1">
+                                <a:latin typeface="Cambria Math" panose="02040503050406030204" pitchFamily="18" charset="0"/>
+                              </a:rPr>
                             </m:ctrlPr>
                           </m:dPr>
                           <m:e>
                             <m:r>
-                              <a:rPr lang="en-US" i="1"/>
+                              <a:rPr lang="en-US" i="1">
+                                <a:latin typeface="Cambria Math" panose="02040503050406030204" pitchFamily="18" charset="0"/>
+                              </a:rPr>
                               <m:t>𝑡</m:t>
                             </m:r>
                           </m:e>
                         </m:d>
                         <m:r>
-                          <a:rPr lang="en-US" i="1"/>
+                          <a:rPr lang="en-US" i="1">
+                            <a:latin typeface="Cambria Math" panose="02040503050406030204" pitchFamily="18" charset="0"/>
+                          </a:rPr>
                           <m:t> </m:t>
                         </m:r>
                         <m:sSub>
                           <m:sSubPr>
                             <m:ctrlPr>
-                              <a:rPr lang="en-US" i="1"/>
+                              <a:rPr lang="en-US" i="1">
+                                <a:latin typeface="Cambria Math" panose="02040503050406030204" pitchFamily="18" charset="0"/>
+                              </a:rPr>
                             </m:ctrlPr>
                           </m:sSubPr>
                           <m:e>
                             <m:r>
-                              <a:rPr lang="en-US" i="1"/>
+                              <a:rPr lang="en-US" i="1">
+                                <a:latin typeface="Cambria Math" panose="02040503050406030204" pitchFamily="18" charset="0"/>
+                              </a:rPr>
                               <m:t>𝑃</m:t>
                             </m:r>
                           </m:e>
                           <m:sub>
                             <m:r>
-                              <a:rPr lang="en-US" i="1"/>
+                              <a:rPr lang="en-US" i="1">
+                                <a:latin typeface="Cambria Math" panose="02040503050406030204" pitchFamily="18" charset="0"/>
+                              </a:rPr>
                               <m:t>𝑝</m:t>
                             </m:r>
                           </m:sub>
@@ -14780,7 +14802,7 @@
             </p:txBody>
           </p:sp>
         </mc:Choice>
-        <mc:Fallback>
+        <mc:Fallback xmlns="">
           <p:sp>
             <p:nvSpPr>
               <p:cNvPr id="144" name="Textfeld 143"/>
@@ -15921,7 +15943,7 @@
           <p:spPr>
             <a:xfrm>
               <a:off x="1020228" y="1610336"/>
-              <a:ext cx="852156" cy="474410"/>
+              <a:ext cx="540212" cy="474410"/>
             </a:xfrm>
             <a:prstGeom prst="rect">
               <a:avLst/>
@@ -15935,8 +15957,8 @@
             <a:lstStyle/>
             <a:p>
               <a:r>
-                <a:rPr lang="de-DE" dirty="0" err="1" smtClean="0"/>
-                <a:t>District</a:t>
+                <a:rPr lang="de-DE" dirty="0" smtClean="0"/>
+                <a:t>Age</a:t>
               </a:r>
               <a:endParaRPr lang="en-US" dirty="0"/>
             </a:p>

</xml_diff>